<commit_message>
svx: consider color effects when updating objects for theme changes
This builds on top of commit e37b274d91c83c29de69671a29d1ae985865e5da
(svx: update objects of pages of a master page when the theme changes,
2021-11-30), but now not only plain colors with colors with effects are
also considered. The luminance modulation / offset is what PowerPoint
uses the generate lighter / darker variants, tinting / shading is what
Word uses.

Change-Id: Ibfafb9be9986645117015bf3b05491daec8914be
Reviewed-on: https://gerrit.libreoffice.org/c/core/+/126270
Reviewed-by: Miklos Vajna <vmiklos@collabora.com>
Tested-by: Jenkins
</commit_message>
<xml_diff>
--- a/svx/qa/unit/data/theme.pptx
+++ b/svx/qa/unit/data/theme.pptx
@@ -109,6 +109,14 @@
       </a:defRPr>
     </a:lvl9pPr>
   </p:defaultTextStyle>
+  <p:extLst>
+    <p:ext uri="{EFAFB233-063F-42B5-8137-9DF3F51BA10A}">
+      <p15:sldGuideLst xmlns:p15="http://schemas.microsoft.com/office/powerpoint/2012/main"/>
+    </p:ext>
+    <p:ext uri="{2D200454-40CA-4A62-9FC3-DE9A4176ACB9}">
+      <p15:notesGuideLst xmlns:p15="http://schemas.microsoft.com/office/powerpoint/2012/main"/>
+    </p:ext>
+  </p:extLst>
 </p:presentation>
 </file>
 
@@ -194,7 +202,7 @@
           <a:p>
             <a:fld id="{8874CA3F-F526-4CA2-9ED8-D851F41437A5}" type="datetimeFigureOut">
               <a:rPr lang="en-US" smtClean="0"/>
-              <a:t>11/29/2021</a:t>
+              <a:t>12/2/2021</a:t>
             </a:fld>
             <a:endParaRPr lang="en-US"/>
           </a:p>
@@ -608,7 +616,7 @@
           <a:p>
             <a:fld id="{3952C6CF-7453-4D5D-955A-AFFA6BD0D6A5}" type="datetimeFigureOut">
               <a:rPr lang="en-US" smtClean="0"/>
-              <a:t>11/29/2021</a:t>
+              <a:t>12/2/2021</a:t>
             </a:fld>
             <a:endParaRPr lang="en-US"/>
           </a:p>
@@ -879,7 +887,7 @@
           <a:p>
             <a:fld id="{3952C6CF-7453-4D5D-955A-AFFA6BD0D6A5}" type="datetimeFigureOut">
               <a:rPr lang="en-US" smtClean="0"/>
-              <a:t>11/29/2021</a:t>
+              <a:t>12/2/2021</a:t>
             </a:fld>
             <a:endParaRPr lang="en-US"/>
           </a:p>
@@ -1421,7 +1429,7 @@
           <a:p>
             <a:fld id="{3952C6CF-7453-4D5D-955A-AFFA6BD0D6A5}" type="datetimeFigureOut">
               <a:rPr lang="en-US" smtClean="0"/>
-              <a:t>11/29/2021</a:t>
+              <a:t>12/2/2021</a:t>
             </a:fld>
             <a:endParaRPr lang="en-US"/>
           </a:p>
@@ -1985,6 +1993,129 @@
                 </a:solidFill>
               </a:rPr>
               <a:t>Some text</a:t>
+            </a:r>
+          </a:p>
+        </p:txBody>
+      </p:sp>
+      <p:sp>
+        <p:nvSpPr>
+          <p:cNvPr id="3" name="Rectangle: Rounded Corners 2">
+            <a:extLst>
+              <a:ext uri="{FF2B5EF4-FFF2-40B4-BE49-F238E27FC236}">
+                <a16:creationId xmlns:a16="http://schemas.microsoft.com/office/drawing/2014/main" id="{7F4AE10D-EB27-4400-9006-771A0A185420}"/>
+              </a:ext>
+            </a:extLst>
+          </p:cNvPr>
+          <p:cNvSpPr/>
+          <p:nvPr/>
+        </p:nvSpPr>
+        <p:spPr>
+          <a:xfrm>
+            <a:off x="4664765" y="894522"/>
+            <a:ext cx="2862470" cy="1212574"/>
+          </a:xfrm>
+          <a:prstGeom prst="roundRect">
+            <a:avLst/>
+          </a:prstGeom>
+          <a:noFill/>
+          <a:ln>
+            <a:solidFill>
+              <a:srgbClr val="000000"/>
+            </a:solidFill>
+          </a:ln>
+        </p:spPr>
+        <p:style>
+          <a:lnRef idx="2">
+            <a:schemeClr val="accent1">
+              <a:shade val="50000"/>
+            </a:schemeClr>
+          </a:lnRef>
+          <a:fillRef idx="1">
+            <a:schemeClr val="accent1"/>
+          </a:fillRef>
+          <a:effectRef idx="0">
+            <a:schemeClr val="accent1"/>
+          </a:effectRef>
+          <a:fontRef idx="minor">
+            <a:schemeClr val="lt1"/>
+          </a:fontRef>
+        </p:style>
+        <p:txBody>
+          <a:bodyPr rtlCol="0" anchor="ctr"/>
+          <a:lstStyle/>
+          <a:p>
+            <a:pPr algn="ctr"/>
+            <a:r>
+              <a:rPr lang="en-US" dirty="0">
+                <a:solidFill>
+                  <a:schemeClr val="accent1">
+                    <a:lumMod val="40000"/>
+                    <a:lumOff val="60000"/>
+                  </a:schemeClr>
+                </a:solidFill>
+              </a:rPr>
+              <a:t>Some text, 60% lighter</a:t>
+            </a:r>
+          </a:p>
+        </p:txBody>
+      </p:sp>
+      <p:sp>
+        <p:nvSpPr>
+          <p:cNvPr id="5" name="Rectangle: Rounded Corners 4">
+            <a:extLst>
+              <a:ext uri="{FF2B5EF4-FFF2-40B4-BE49-F238E27FC236}">
+                <a16:creationId xmlns:a16="http://schemas.microsoft.com/office/drawing/2014/main" id="{1E0A31F0-4B70-4F03-B80F-0E46BCB0827C}"/>
+              </a:ext>
+            </a:extLst>
+          </p:cNvPr>
+          <p:cNvSpPr/>
+          <p:nvPr/>
+        </p:nvSpPr>
+        <p:spPr>
+          <a:xfrm>
+            <a:off x="7709452" y="894522"/>
+            <a:ext cx="2862470" cy="1212574"/>
+          </a:xfrm>
+          <a:prstGeom prst="roundRect">
+            <a:avLst/>
+          </a:prstGeom>
+          <a:noFill/>
+          <a:ln>
+            <a:solidFill>
+              <a:srgbClr val="000000"/>
+            </a:solidFill>
+          </a:ln>
+        </p:spPr>
+        <p:style>
+          <a:lnRef idx="2">
+            <a:schemeClr val="accent1">
+              <a:shade val="50000"/>
+            </a:schemeClr>
+          </a:lnRef>
+          <a:fillRef idx="1">
+            <a:schemeClr val="accent1"/>
+          </a:fillRef>
+          <a:effectRef idx="0">
+            <a:schemeClr val="accent1"/>
+          </a:effectRef>
+          <a:fontRef idx="minor">
+            <a:schemeClr val="lt1"/>
+          </a:fontRef>
+        </p:style>
+        <p:txBody>
+          <a:bodyPr rtlCol="0" anchor="ctr"/>
+          <a:lstStyle/>
+          <a:p>
+            <a:pPr algn="ctr"/>
+            <a:r>
+              <a:rPr lang="en-US" dirty="0">
+                <a:solidFill>
+                  <a:schemeClr val="accent1">
+                    <a:lumMod val="75000"/>
+                  </a:schemeClr>
+                </a:solidFill>
+              </a:rPr>
+              <a:t>Some text, 25% darker</a:t>
             </a:r>
           </a:p>
         </p:txBody>

</xml_diff>

<commit_message>
sd theme: fix applying new colors after theme change for group shapes
UpdateSdrObject() is called for both group and non-group shapes, so
don't assume that they always have text, otherwise we would crash.

Change-Id: I3672673176f0cb462a8b8d61a68466f541e9ce06
Reviewed-on: https://gerrit.libreoffice.org/c/core/+/128248
Reviewed-by: Miklos Vajna <vmiklos@collabora.com>
Tested-by: Jenkins
</commit_message>
<xml_diff>
--- a/svx/qa/unit/data/theme.pptx
+++ b/svx/qa/unit/data/theme.pptx
@@ -202,7 +202,7 @@
           <a:p>
             <a:fld id="{8874CA3F-F526-4CA2-9ED8-D851F41437A5}" type="datetimeFigureOut">
               <a:rPr lang="en-US" smtClean="0"/>
-              <a:t>12/2/2021</a:t>
+              <a:t>1/10/2022</a:t>
             </a:fld>
             <a:endParaRPr lang="en-US"/>
           </a:p>
@@ -616,7 +616,7 @@
           <a:p>
             <a:fld id="{3952C6CF-7453-4D5D-955A-AFFA6BD0D6A5}" type="datetimeFigureOut">
               <a:rPr lang="en-US" smtClean="0"/>
-              <a:t>12/2/2021</a:t>
+              <a:t>1/10/2022</a:t>
             </a:fld>
             <a:endParaRPr lang="en-US"/>
           </a:p>
@@ -887,7 +887,7 @@
           <a:p>
             <a:fld id="{3952C6CF-7453-4D5D-955A-AFFA6BD0D6A5}" type="datetimeFigureOut">
               <a:rPr lang="en-US" smtClean="0"/>
-              <a:t>12/2/2021</a:t>
+              <a:t>1/10/2022</a:t>
             </a:fld>
             <a:endParaRPr lang="en-US"/>
           </a:p>
@@ -1429,7 +1429,7 @@
           <a:p>
             <a:fld id="{3952C6CF-7453-4D5D-955A-AFFA6BD0D6A5}" type="datetimeFigureOut">
               <a:rPr lang="en-US" smtClean="0"/>
-              <a:t>12/2/2021</a:t>
+              <a:t>1/10/2022</a:t>
             </a:fld>
             <a:endParaRPr lang="en-US"/>
           </a:p>
@@ -2120,6 +2120,125 @@
           </a:p>
         </p:txBody>
       </p:sp>
+      <p:grpSp>
+        <p:nvGrpSpPr>
+          <p:cNvPr id="7" name="Group 6">
+            <a:extLst>
+              <a:ext uri="{FF2B5EF4-FFF2-40B4-BE49-F238E27FC236}">
+                <a16:creationId xmlns:a16="http://schemas.microsoft.com/office/drawing/2014/main" id="{C392DECE-E2C5-4733-98B5-4F16C2DB4E19}"/>
+              </a:ext>
+            </a:extLst>
+          </p:cNvPr>
+          <p:cNvGrpSpPr/>
+          <p:nvPr/>
+        </p:nvGrpSpPr>
+        <p:grpSpPr>
+          <a:xfrm>
+            <a:off x="1272209" y="3826564"/>
+            <a:ext cx="3491948" cy="1818862"/>
+            <a:chOff x="1272209" y="3826564"/>
+            <a:chExt cx="3491948" cy="1818862"/>
+          </a:xfrm>
+        </p:grpSpPr>
+        <p:sp>
+          <p:nvSpPr>
+            <p:cNvPr id="2" name="Isosceles Triangle 1">
+              <a:extLst>
+                <a:ext uri="{FF2B5EF4-FFF2-40B4-BE49-F238E27FC236}">
+                  <a16:creationId xmlns:a16="http://schemas.microsoft.com/office/drawing/2014/main" id="{4664B984-9235-4765-B989-3AD25E28F213}"/>
+                </a:ext>
+              </a:extLst>
+            </p:cNvPr>
+            <p:cNvSpPr/>
+            <p:nvPr/>
+          </p:nvSpPr>
+          <p:spPr>
+            <a:xfrm>
+              <a:off x="1272209" y="3826565"/>
+              <a:ext cx="1669774" cy="1818861"/>
+            </a:xfrm>
+            <a:prstGeom prst="triangle">
+              <a:avLst/>
+            </a:prstGeom>
+          </p:spPr>
+          <p:style>
+            <a:lnRef idx="2">
+              <a:schemeClr val="accent1">
+                <a:shade val="50000"/>
+              </a:schemeClr>
+            </a:lnRef>
+            <a:fillRef idx="1">
+              <a:schemeClr val="accent1"/>
+            </a:fillRef>
+            <a:effectRef idx="0">
+              <a:schemeClr val="accent1"/>
+            </a:effectRef>
+            <a:fontRef idx="minor">
+              <a:schemeClr val="lt1"/>
+            </a:fontRef>
+          </p:style>
+          <p:txBody>
+            <a:bodyPr rtlCol="0" anchor="ctr"/>
+            <a:lstStyle/>
+            <a:p>
+              <a:pPr algn="ctr"/>
+              <a:r>
+                <a:rPr lang="en-US" dirty="0"/>
+                <a:t>group</a:t>
+              </a:r>
+            </a:p>
+          </p:txBody>
+        </p:sp>
+        <p:sp>
+          <p:nvSpPr>
+            <p:cNvPr id="6" name="Isosceles Triangle 5">
+              <a:extLst>
+                <a:ext uri="{FF2B5EF4-FFF2-40B4-BE49-F238E27FC236}">
+                  <a16:creationId xmlns:a16="http://schemas.microsoft.com/office/drawing/2014/main" id="{7764AE9E-5F22-45C8-A702-38FF4E2AE42D}"/>
+                </a:ext>
+              </a:extLst>
+            </p:cNvPr>
+            <p:cNvSpPr/>
+            <p:nvPr/>
+          </p:nvSpPr>
+          <p:spPr>
+            <a:xfrm>
+              <a:off x="3094383" y="3826564"/>
+              <a:ext cx="1669774" cy="1818861"/>
+            </a:xfrm>
+            <a:prstGeom prst="triangle">
+              <a:avLst/>
+            </a:prstGeom>
+          </p:spPr>
+          <p:style>
+            <a:lnRef idx="2">
+              <a:schemeClr val="accent1">
+                <a:shade val="50000"/>
+              </a:schemeClr>
+            </a:lnRef>
+            <a:fillRef idx="1">
+              <a:schemeClr val="accent1"/>
+            </a:fillRef>
+            <a:effectRef idx="0">
+              <a:schemeClr val="accent1"/>
+            </a:effectRef>
+            <a:fontRef idx="minor">
+              <a:schemeClr val="lt1"/>
+            </a:fontRef>
+          </p:style>
+          <p:txBody>
+            <a:bodyPr rtlCol="0" anchor="ctr"/>
+            <a:lstStyle/>
+            <a:p>
+              <a:pPr algn="ctr"/>
+              <a:r>
+                <a:rPr lang="en-US" dirty="0"/>
+                <a:t>group</a:t>
+              </a:r>
+            </a:p>
+          </p:txBody>
+        </p:sp>
+      </p:grpSp>
     </p:spTree>
     <p:extLst>
       <p:ext uri="{BB962C8B-B14F-4D97-AF65-F5344CB8AC3E}">

</xml_diff>

<commit_message>
sd theme: add rendering for shape fill color
I.e. update the shape fill color when the theme of the master page
changes if the color is a theme color.

Change-Id: Ia1ed566230a8547334aa4a7d69627882aa690546
Reviewed-on: https://gerrit.libreoffice.org/c/core/+/130894
Tested-by: Jenkins
Reviewed-by: Miklos Vajna <vmiklos@collabora.com>
</commit_message>
<xml_diff>
--- a/svx/qa/unit/data/theme.pptx
+++ b/svx/qa/unit/data/theme.pptx
@@ -202,7 +202,7 @@
           <a:p>
             <a:fld id="{8874CA3F-F526-4CA2-9ED8-D851F41437A5}" type="datetimeFigureOut">
               <a:rPr lang="en-US" smtClean="0"/>
-              <a:t>1/10/2022</a:t>
+              <a:t>2/11/2022</a:t>
             </a:fld>
             <a:endParaRPr lang="en-US"/>
           </a:p>
@@ -616,7 +616,7 @@
           <a:p>
             <a:fld id="{3952C6CF-7453-4D5D-955A-AFFA6BD0D6A5}" type="datetimeFigureOut">
               <a:rPr lang="en-US" smtClean="0"/>
-              <a:t>1/10/2022</a:t>
+              <a:t>2/11/2022</a:t>
             </a:fld>
             <a:endParaRPr lang="en-US"/>
           </a:p>
@@ -887,7 +887,7 @@
           <a:p>
             <a:fld id="{3952C6CF-7453-4D5D-955A-AFFA6BD0D6A5}" type="datetimeFigureOut">
               <a:rPr lang="en-US" smtClean="0"/>
-              <a:t>1/10/2022</a:t>
+              <a:t>2/11/2022</a:t>
             </a:fld>
             <a:endParaRPr lang="en-US"/>
           </a:p>
@@ -1429,7 +1429,7 @@
           <a:p>
             <a:fld id="{3952C6CF-7453-4D5D-955A-AFFA6BD0D6A5}" type="datetimeFigureOut">
               <a:rPr lang="en-US" smtClean="0"/>
-              <a:t>1/10/2022</a:t>
+              <a:t>2/11/2022</a:t>
             </a:fld>
             <a:endParaRPr lang="en-US"/>
           </a:p>
@@ -2239,6 +2239,55 @@
           </p:txBody>
         </p:sp>
       </p:grpSp>
+      <p:sp>
+        <p:nvSpPr>
+          <p:cNvPr id="8" name="Rectangle: Rounded Corners 7">
+            <a:extLst>
+              <a:ext uri="{FF2B5EF4-FFF2-40B4-BE49-F238E27FC236}">
+                <a16:creationId xmlns:a16="http://schemas.microsoft.com/office/drawing/2014/main" id="{18BBC3B0-8DB0-4708-946D-F173E2ABBF5C}"/>
+              </a:ext>
+            </a:extLst>
+          </p:cNvPr>
+          <p:cNvSpPr/>
+          <p:nvPr/>
+        </p:nvSpPr>
+        <p:spPr>
+          <a:xfrm>
+            <a:off x="5615609" y="3220278"/>
+            <a:ext cx="2166730" cy="1212574"/>
+          </a:xfrm>
+          <a:prstGeom prst="roundRect">
+            <a:avLst/>
+          </a:prstGeom>
+        </p:spPr>
+        <p:style>
+          <a:lnRef idx="2">
+            <a:schemeClr val="accent1">
+              <a:shade val="50000"/>
+            </a:schemeClr>
+          </a:lnRef>
+          <a:fillRef idx="1">
+            <a:schemeClr val="accent1"/>
+          </a:fillRef>
+          <a:effectRef idx="0">
+            <a:schemeClr val="accent1"/>
+          </a:effectRef>
+          <a:fontRef idx="minor">
+            <a:schemeClr val="lt1"/>
+          </a:fontRef>
+        </p:style>
+        <p:txBody>
+          <a:bodyPr rtlCol="0" anchor="ctr"/>
+          <a:lstStyle/>
+          <a:p>
+            <a:pPr algn="ctr"/>
+            <a:r>
+              <a:rPr lang="en-US" dirty="0"/>
+              <a:t>shape fill</a:t>
+            </a:r>
+          </a:p>
+        </p:txBody>
+      </p:sp>
     </p:spTree>
     <p:extLst>
       <p:ext uri="{BB962C8B-B14F-4D97-AF65-F5344CB8AC3E}">

</xml_diff>

<commit_message>
sd theme: add rendering for shape fill color effects
Only the no-effects variant was working previously.

Change-Id: I50811a4c49d19dc801f0d1c841cbbdb2fae1ad60
Reviewed-on: https://gerrit.libreoffice.org/c/core/+/133297
Tested-by: Jenkins
Reviewed-by: Miklos Vajna <vmiklos@collabora.com>
</commit_message>
<xml_diff>
--- a/svx/qa/unit/data/theme.pptx
+++ b/svx/qa/unit/data/theme.pptx
@@ -202,7 +202,7 @@
           <a:p>
             <a:fld id="{8874CA3F-F526-4CA2-9ED8-D851F41437A5}" type="datetimeFigureOut">
               <a:rPr lang="en-US" smtClean="0"/>
-              <a:t>2/11/2022</a:t>
+              <a:t>2/28/2022</a:t>
             </a:fld>
             <a:endParaRPr lang="en-US"/>
           </a:p>
@@ -616,7 +616,7 @@
           <a:p>
             <a:fld id="{3952C6CF-7453-4D5D-955A-AFFA6BD0D6A5}" type="datetimeFigureOut">
               <a:rPr lang="en-US" smtClean="0"/>
-              <a:t>2/11/2022</a:t>
+              <a:t>2/28/2022</a:t>
             </a:fld>
             <a:endParaRPr lang="en-US"/>
           </a:p>
@@ -887,7 +887,7 @@
           <a:p>
             <a:fld id="{3952C6CF-7453-4D5D-955A-AFFA6BD0D6A5}" type="datetimeFigureOut">
               <a:rPr lang="en-US" smtClean="0"/>
-              <a:t>2/11/2022</a:t>
+              <a:t>2/28/2022</a:t>
             </a:fld>
             <a:endParaRPr lang="en-US"/>
           </a:p>
@@ -1429,7 +1429,7 @@
           <a:p>
             <a:fld id="{3952C6CF-7453-4D5D-955A-AFFA6BD0D6A5}" type="datetimeFigureOut">
               <a:rPr lang="en-US" smtClean="0"/>
-              <a:t>2/11/2022</a:t>
+              <a:t>2/28/2022</a:t>
             </a:fld>
             <a:endParaRPr lang="en-US"/>
           </a:p>
@@ -2284,6 +2284,115 @@
             <a:r>
               <a:rPr lang="en-US" dirty="0"/>
               <a:t>shape fill</a:t>
+            </a:r>
+          </a:p>
+        </p:txBody>
+      </p:sp>
+      <p:sp>
+        <p:nvSpPr>
+          <p:cNvPr id="9" name="Rectangle: Rounded Corners 8">
+            <a:extLst>
+              <a:ext uri="{FF2B5EF4-FFF2-40B4-BE49-F238E27FC236}">
+                <a16:creationId xmlns:a16="http://schemas.microsoft.com/office/drawing/2014/main" id="{43F86C3F-C9CA-42E6-A066-6A424B2AE454}"/>
+              </a:ext>
+            </a:extLst>
+          </p:cNvPr>
+          <p:cNvSpPr/>
+          <p:nvPr/>
+        </p:nvSpPr>
+        <p:spPr>
+          <a:xfrm>
+            <a:off x="7914861" y="3220277"/>
+            <a:ext cx="2166730" cy="1212574"/>
+          </a:xfrm>
+          <a:prstGeom prst="roundRect">
+            <a:avLst/>
+          </a:prstGeom>
+          <a:solidFill>
+            <a:schemeClr val="accent1">
+              <a:lumMod val="40000"/>
+              <a:lumOff val="60000"/>
+            </a:schemeClr>
+          </a:solidFill>
+        </p:spPr>
+        <p:style>
+          <a:lnRef idx="2">
+            <a:schemeClr val="accent1">
+              <a:shade val="50000"/>
+            </a:schemeClr>
+          </a:lnRef>
+          <a:fillRef idx="1">
+            <a:schemeClr val="accent1"/>
+          </a:fillRef>
+          <a:effectRef idx="0">
+            <a:schemeClr val="accent1"/>
+          </a:effectRef>
+          <a:fontRef idx="minor">
+            <a:schemeClr val="lt1"/>
+          </a:fontRef>
+        </p:style>
+        <p:txBody>
+          <a:bodyPr rtlCol="0" anchor="ctr"/>
+          <a:lstStyle/>
+          <a:p>
+            <a:pPr algn="ctr"/>
+            <a:r>
+              <a:rPr lang="en-US" dirty="0"/>
+              <a:t>shape fill, 60% lighter</a:t>
+            </a:r>
+          </a:p>
+        </p:txBody>
+      </p:sp>
+      <p:sp>
+        <p:nvSpPr>
+          <p:cNvPr id="10" name="Rectangle: Rounded Corners 9">
+            <a:extLst>
+              <a:ext uri="{FF2B5EF4-FFF2-40B4-BE49-F238E27FC236}">
+                <a16:creationId xmlns:a16="http://schemas.microsoft.com/office/drawing/2014/main" id="{F0D73F93-A1F0-4962-907B-5FE6A5BE0AE1}"/>
+              </a:ext>
+            </a:extLst>
+          </p:cNvPr>
+          <p:cNvSpPr/>
+          <p:nvPr/>
+        </p:nvSpPr>
+        <p:spPr>
+          <a:xfrm>
+            <a:off x="10214113" y="3220277"/>
+            <a:ext cx="2166730" cy="1212574"/>
+          </a:xfrm>
+          <a:prstGeom prst="roundRect">
+            <a:avLst/>
+          </a:prstGeom>
+          <a:solidFill>
+            <a:schemeClr val="accent1">
+              <a:lumMod val="75000"/>
+            </a:schemeClr>
+          </a:solidFill>
+        </p:spPr>
+        <p:style>
+          <a:lnRef idx="2">
+            <a:schemeClr val="accent1">
+              <a:shade val="50000"/>
+            </a:schemeClr>
+          </a:lnRef>
+          <a:fillRef idx="1">
+            <a:schemeClr val="accent1"/>
+          </a:fillRef>
+          <a:effectRef idx="0">
+            <a:schemeClr val="accent1"/>
+          </a:effectRef>
+          <a:fontRef idx="minor">
+            <a:schemeClr val="lt1"/>
+          </a:fontRef>
+        </p:style>
+        <p:txBody>
+          <a:bodyPr rtlCol="0" anchor="ctr"/>
+          <a:lstStyle/>
+          <a:p>
+            <a:pPr algn="ctr"/>
+            <a:r>
+              <a:rPr lang="en-US" dirty="0"/>
+              <a:t>shape fill, 25% darker</a:t>
             </a:r>
           </a:p>
         </p:txBody>

</xml_diff>